<commit_message>
Updated PowerPoint contact info.
</commit_message>
<xml_diff>
--- a/DeepLearningBasics/Deep Learning Basics.pptx
+++ b/DeepLearningBasics/Deep Learning Basics.pptx
@@ -15066,7 +15066,7 @@
         <p:spPr/>
         <p:txBody>
           <a:bodyPr>
-            <a:normAutofit lnSpcReduction="10000"/>
+            <a:normAutofit fontScale="85000" lnSpcReduction="20000"/>
           </a:bodyPr>
           <a:lstStyle/>
           <a:p>
@@ -15075,7 +15075,14 @@
           <a:p>
             <a:r>
               <a:rPr lang="en-US" dirty="0"/>
-              <a:t>Joe May’s Email: </a:t>
+              <a:t>Joe Mayo:</a:t>
+            </a:r>
+          </a:p>
+          <a:p>
+            <a:pPr lvl="1"/>
+            <a:r>
+              <a:rPr lang="en-US" dirty="0"/>
+              <a:t>Email: </a:t>
             </a:r>
             <a:r>
               <a:rPr lang="en-US" dirty="0">
@@ -15089,9 +15096,17 @@
             </a:r>
           </a:p>
           <a:p>
+            <a:pPr lvl="1"/>
             <a:r>
               <a:rPr lang="en-US" dirty="0"/>
-              <a:t>Code - </a:t>
+              <a:t>Twitter: @JoeMayo </a:t>
+            </a:r>
+          </a:p>
+          <a:p>
+            <a:pPr lvl="1"/>
+            <a:r>
+              <a:rPr lang="en-US"/>
+              <a:t>Code: </a:t>
             </a:r>
             <a:r>
               <a:rPr lang="en-US" dirty="0">

</xml_diff>

<commit_message>
Removed unused code parameters and removed unused syntax. Updated presentation slides to correct spelling and clarify a couple slides.
</commit_message>
<xml_diff>
--- a/DeepLearningBasics/Deep Learning Basics.pptx
+++ b/DeepLearningBasics/Deep Learning Basics.pptx
@@ -378,7 +378,7 @@
           <a:p>
             <a:fld id="{9A02A7AE-4A41-4597-A4E5-1F51E604A422}" type="datetimeFigureOut">
               <a:rPr lang="en-US" smtClean="0"/>
-              <a:t>9/6/2018</a:t>
+              <a:t>10/10/2019</a:t>
             </a:fld>
             <a:endParaRPr lang="en-US"/>
           </a:p>
@@ -717,7 +717,7 @@
           <a:p>
             <a:fld id="{9A02A7AE-4A41-4597-A4E5-1F51E604A422}" type="datetimeFigureOut">
               <a:rPr lang="en-US" smtClean="0"/>
-              <a:t>9/6/2018</a:t>
+              <a:t>10/10/2019</a:t>
             </a:fld>
             <a:endParaRPr lang="en-US"/>
           </a:p>
@@ -995,7 +995,7 @@
           <a:p>
             <a:fld id="{9A02A7AE-4A41-4597-A4E5-1F51E604A422}" type="datetimeFigureOut">
               <a:rPr lang="en-US" smtClean="0"/>
-              <a:t>9/6/2018</a:t>
+              <a:t>10/10/2019</a:t>
             </a:fld>
             <a:endParaRPr lang="en-US"/>
           </a:p>
@@ -1563,7 +1563,7 @@
           <a:p>
             <a:fld id="{9A02A7AE-4A41-4597-A4E5-1F51E604A422}" type="datetimeFigureOut">
               <a:rPr lang="en-US" smtClean="0"/>
-              <a:t>9/6/2018</a:t>
+              <a:t>10/10/2019</a:t>
             </a:fld>
             <a:endParaRPr lang="en-US"/>
           </a:p>
@@ -1841,7 +1841,7 @@
           <a:p>
             <a:fld id="{9A02A7AE-4A41-4597-A4E5-1F51E604A422}" type="datetimeFigureOut">
               <a:rPr lang="en-US" smtClean="0"/>
-              <a:t>9/6/2018</a:t>
+              <a:t>10/10/2019</a:t>
             </a:fld>
             <a:endParaRPr lang="en-US"/>
           </a:p>
@@ -2403,7 +2403,7 @@
           <a:p>
             <a:fld id="{9A02A7AE-4A41-4597-A4E5-1F51E604A422}" type="datetimeFigureOut">
               <a:rPr lang="en-US" smtClean="0"/>
-              <a:t>9/6/2018</a:t>
+              <a:t>10/10/2019</a:t>
             </a:fld>
             <a:endParaRPr lang="en-US"/>
           </a:p>
@@ -2730,7 +2730,7 @@
           <a:p>
             <a:fld id="{9A02A7AE-4A41-4597-A4E5-1F51E604A422}" type="datetimeFigureOut">
               <a:rPr lang="en-US" smtClean="0"/>
-              <a:t>9/6/2018</a:t>
+              <a:t>10/10/2019</a:t>
             </a:fld>
             <a:endParaRPr lang="en-US"/>
           </a:p>
@@ -2935,7 +2935,7 @@
           <a:p>
             <a:fld id="{9A02A7AE-4A41-4597-A4E5-1F51E604A422}" type="datetimeFigureOut">
               <a:rPr lang="en-US" smtClean="0"/>
-              <a:t>9/6/2018</a:t>
+              <a:t>10/10/2019</a:t>
             </a:fld>
             <a:endParaRPr lang="en-US"/>
           </a:p>
@@ -3145,7 +3145,7 @@
           <a:p>
             <a:fld id="{9A02A7AE-4A41-4597-A4E5-1F51E604A422}" type="datetimeFigureOut">
               <a:rPr lang="en-US" smtClean="0"/>
-              <a:t>9/6/2018</a:t>
+              <a:t>10/10/2019</a:t>
             </a:fld>
             <a:endParaRPr lang="en-US"/>
           </a:p>
@@ -3345,7 +3345,7 @@
           <a:p>
             <a:fld id="{9A02A7AE-4A41-4597-A4E5-1F51E604A422}" type="datetimeFigureOut">
               <a:rPr lang="en-US" smtClean="0"/>
-              <a:t>9/6/2018</a:t>
+              <a:t>10/10/2019</a:t>
             </a:fld>
             <a:endParaRPr lang="en-US"/>
           </a:p>
@@ -3621,7 +3621,7 @@
           <a:p>
             <a:fld id="{9A02A7AE-4A41-4597-A4E5-1F51E604A422}" type="datetimeFigureOut">
               <a:rPr lang="en-US" smtClean="0"/>
-              <a:t>9/6/2018</a:t>
+              <a:t>10/10/2019</a:t>
             </a:fld>
             <a:endParaRPr lang="en-US"/>
           </a:p>
@@ -3887,7 +3887,7 @@
           <a:p>
             <a:fld id="{9A02A7AE-4A41-4597-A4E5-1F51E604A422}" type="datetimeFigureOut">
               <a:rPr lang="en-US" smtClean="0"/>
-              <a:t>9/6/2018</a:t>
+              <a:t>10/10/2019</a:t>
             </a:fld>
             <a:endParaRPr lang="en-US"/>
           </a:p>
@@ -4261,7 +4261,7 @@
           <a:p>
             <a:fld id="{9A02A7AE-4A41-4597-A4E5-1F51E604A422}" type="datetimeFigureOut">
               <a:rPr lang="en-US" smtClean="0"/>
-              <a:t>9/6/2018</a:t>
+              <a:t>10/10/2019</a:t>
             </a:fld>
             <a:endParaRPr lang="en-US"/>
           </a:p>
@@ -4409,7 +4409,7 @@
           <a:p>
             <a:fld id="{9A02A7AE-4A41-4597-A4E5-1F51E604A422}" type="datetimeFigureOut">
               <a:rPr lang="en-US" smtClean="0"/>
-              <a:t>9/6/2018</a:t>
+              <a:t>10/10/2019</a:t>
             </a:fld>
             <a:endParaRPr lang="en-US"/>
           </a:p>
@@ -4534,7 +4534,7 @@
           <a:p>
             <a:fld id="{9A02A7AE-4A41-4597-A4E5-1F51E604A422}" type="datetimeFigureOut">
               <a:rPr lang="en-US" smtClean="0"/>
-              <a:t>9/6/2018</a:t>
+              <a:t>10/10/2019</a:t>
             </a:fld>
             <a:endParaRPr lang="en-US"/>
           </a:p>
@@ -4824,7 +4824,7 @@
           <a:p>
             <a:fld id="{9A02A7AE-4A41-4597-A4E5-1F51E604A422}" type="datetimeFigureOut">
               <a:rPr lang="en-US" smtClean="0"/>
-              <a:t>9/6/2018</a:t>
+              <a:t>10/10/2019</a:t>
             </a:fld>
             <a:endParaRPr lang="en-US"/>
           </a:p>
@@ -5153,7 +5153,7 @@
           <a:p>
             <a:fld id="{9A02A7AE-4A41-4597-A4E5-1F51E604A422}" type="datetimeFigureOut">
               <a:rPr lang="en-US" smtClean="0"/>
-              <a:t>9/6/2018</a:t>
+              <a:t>10/10/2019</a:t>
             </a:fld>
             <a:endParaRPr lang="en-US"/>
           </a:p>
@@ -5367,7 +5367,7 @@
           <a:p>
             <a:fld id="{9A02A7AE-4A41-4597-A4E5-1F51E604A422}" type="datetimeFigureOut">
               <a:rPr lang="en-US" smtClean="0"/>
-              <a:t>9/6/2018</a:t>
+              <a:t>10/10/2019</a:t>
             </a:fld>
             <a:endParaRPr lang="en-US"/>
           </a:p>
@@ -8120,7 +8120,7 @@
           <a:p>
             <a:r>
               <a:rPr lang="en-US" dirty="0"/>
-              <a:t>Demo Program</a:t>
+              <a:t>Demo Program Description</a:t>
             </a:r>
           </a:p>
         </p:txBody>
@@ -11967,7 +11967,7 @@
         <p:spPr>
           <a:xfrm flipH="1" flipV="1">
             <a:off x="3013562" y="5142965"/>
-            <a:ext cx="450149" cy="7843"/>
+            <a:ext cx="308036" cy="7843"/>
           </a:xfrm>
           <a:prstGeom prst="straightConnector1">
             <a:avLst/>
@@ -12083,8 +12083,8 @@
         </p:nvSpPr>
         <p:spPr>
           <a:xfrm>
-            <a:off x="3463711" y="4889198"/>
-            <a:ext cx="1086798" cy="523220"/>
+            <a:off x="3321598" y="4889198"/>
+            <a:ext cx="1303962" cy="523220"/>
           </a:xfrm>
           <a:prstGeom prst="rect">
             <a:avLst/>
@@ -12099,7 +12099,7 @@
           <a:p>
             <a:r>
               <a:rPr lang="en-US" sz="2800" dirty="0"/>
-              <a:t>X*dZ2</a:t>
+              <a:t>A1*dZ2</a:t>
             </a:r>
           </a:p>
         </p:txBody>
@@ -12902,15 +12902,7 @@
           <a:p>
             <a:r>
               <a:rPr lang="en-US" dirty="0"/>
-              <a:t>Why Deep </a:t>
-            </a:r>
-            <a:r>
-              <a:rPr lang="en-US" dirty="0" err="1"/>
-              <a:t>Learing</a:t>
-            </a:r>
-            <a:r>
-              <a:rPr lang="en-US" dirty="0"/>
-              <a:t>?</a:t>
+              <a:t>Why Deep Learning?</a:t>
             </a:r>
           </a:p>
           <a:p>
@@ -15288,36 +15280,26 @@
           </a:p>
           <a:p>
             <a:r>
-              <a:rPr lang="en-US" dirty="0" err="1"/>
-              <a:t>Busness</a:t>
-            </a:r>
-            <a:r>
               <a:rPr lang="en-US" dirty="0"/>
-              <a:t> Data</a:t>
+              <a:t>Image Recognition</a:t>
             </a:r>
           </a:p>
           <a:p>
             <a:r>
               <a:rPr lang="en-US" dirty="0"/>
-              <a:t>IoT Data</a:t>
+              <a:t>Video Analysis</a:t>
             </a:r>
           </a:p>
           <a:p>
             <a:r>
               <a:rPr lang="en-US" dirty="0"/>
-              <a:t>Text</a:t>
+              <a:t>Natural Language Understanding (NLU)</a:t>
             </a:r>
           </a:p>
           <a:p>
             <a:r>
               <a:rPr lang="en-US" dirty="0"/>
-              <a:t>Video</a:t>
-            </a:r>
-          </a:p>
-          <a:p>
-            <a:r>
-              <a:rPr lang="en-US" dirty="0"/>
-              <a:t>Voice</a:t>
+              <a:t>Voice Recognition</a:t>
             </a:r>
           </a:p>
           <a:p>
@@ -19713,7 +19695,10 @@
           <a:lstStyle/>
           <a:p>
             <a:pPr algn="ctr"/>
-            <a:endParaRPr lang="en-US"/>
+            <a:r>
+              <a:rPr lang="en-US" dirty="0"/>
+              <a:t>b2</a:t>
+            </a:r>
           </a:p>
         </p:txBody>
       </p:sp>
@@ -19759,7 +19744,10 @@
           <a:lstStyle/>
           <a:p>
             <a:pPr algn="ctr"/>
-            <a:endParaRPr lang="en-US"/>
+            <a:r>
+              <a:rPr lang="en-US" dirty="0"/>
+              <a:t>b3</a:t>
+            </a:r>
           </a:p>
         </p:txBody>
       </p:sp>
@@ -19805,7 +19793,10 @@
           <a:lstStyle/>
           <a:p>
             <a:pPr algn="ctr"/>
-            <a:endParaRPr lang="en-US"/>
+            <a:r>
+              <a:rPr lang="en-US" dirty="0"/>
+              <a:t>c2</a:t>
+            </a:r>
           </a:p>
         </p:txBody>
       </p:sp>
@@ -19851,7 +19842,10 @@
           <a:lstStyle/>
           <a:p>
             <a:pPr algn="ctr"/>
-            <a:endParaRPr lang="en-US"/>
+            <a:r>
+              <a:rPr lang="en-US" dirty="0"/>
+              <a:t>c1</a:t>
+            </a:r>
           </a:p>
         </p:txBody>
       </p:sp>
@@ -19897,7 +19891,10 @@
           <a:lstStyle/>
           <a:p>
             <a:pPr algn="ctr"/>
-            <a:endParaRPr lang="en-US"/>
+            <a:r>
+              <a:rPr lang="en-US" dirty="0"/>
+              <a:t>b1</a:t>
+            </a:r>
           </a:p>
         </p:txBody>
       </p:sp>
@@ -19943,7 +19940,10 @@
           <a:lstStyle/>
           <a:p>
             <a:pPr algn="ctr"/>
-            <a:endParaRPr lang="en-US"/>
+            <a:r>
+              <a:rPr lang="en-US" dirty="0"/>
+              <a:t>o</a:t>
+            </a:r>
           </a:p>
         </p:txBody>
       </p:sp>
@@ -21880,6 +21880,111 @@
           </a:fontRef>
         </p:style>
       </p:cxnSp>
+      <p:sp>
+        <p:nvSpPr>
+          <p:cNvPr id="64" name="TextBox 63">
+            <a:extLst>
+              <a:ext uri="{FF2B5EF4-FFF2-40B4-BE49-F238E27FC236}">
+                <a16:creationId xmlns:a16="http://schemas.microsoft.com/office/drawing/2014/main" id="{F11022D1-62ED-414C-9435-0AF893BAB79D}"/>
+              </a:ext>
+            </a:extLst>
+          </p:cNvPr>
+          <p:cNvSpPr txBox="1"/>
+          <p:nvPr/>
+        </p:nvSpPr>
+        <p:spPr>
+          <a:xfrm>
+            <a:off x="2409986" y="4269582"/>
+            <a:ext cx="466794" cy="369332"/>
+          </a:xfrm>
+          <a:prstGeom prst="rect">
+            <a:avLst/>
+          </a:prstGeom>
+          <a:noFill/>
+        </p:spPr>
+        <p:txBody>
+          <a:bodyPr wrap="none" rtlCol="0">
+            <a:spAutoFit/>
+          </a:bodyPr>
+          <a:lstStyle/>
+          <a:p>
+            <a:r>
+              <a:rPr lang="en-US" dirty="0"/>
+              <a:t>w4</a:t>
+            </a:r>
+          </a:p>
+        </p:txBody>
+      </p:sp>
+      <p:sp>
+        <p:nvSpPr>
+          <p:cNvPr id="65" name="TextBox 64">
+            <a:extLst>
+              <a:ext uri="{FF2B5EF4-FFF2-40B4-BE49-F238E27FC236}">
+                <a16:creationId xmlns:a16="http://schemas.microsoft.com/office/drawing/2014/main" id="{2E3E6D40-F206-46BF-8A25-B1FFDD5BBD23}"/>
+              </a:ext>
+            </a:extLst>
+          </p:cNvPr>
+          <p:cNvSpPr txBox="1"/>
+          <p:nvPr/>
+        </p:nvSpPr>
+        <p:spPr>
+          <a:xfrm>
+            <a:off x="2835799" y="4690691"/>
+            <a:ext cx="466794" cy="369332"/>
+          </a:xfrm>
+          <a:prstGeom prst="rect">
+            <a:avLst/>
+          </a:prstGeom>
+          <a:noFill/>
+        </p:spPr>
+        <p:txBody>
+          <a:bodyPr wrap="none" rtlCol="0">
+            <a:spAutoFit/>
+          </a:bodyPr>
+          <a:lstStyle/>
+          <a:p>
+            <a:r>
+              <a:rPr lang="en-US" dirty="0"/>
+              <a:t>w5</a:t>
+            </a:r>
+          </a:p>
+        </p:txBody>
+      </p:sp>
+      <p:sp>
+        <p:nvSpPr>
+          <p:cNvPr id="66" name="TextBox 65">
+            <a:extLst>
+              <a:ext uri="{FF2B5EF4-FFF2-40B4-BE49-F238E27FC236}">
+                <a16:creationId xmlns:a16="http://schemas.microsoft.com/office/drawing/2014/main" id="{E3E30140-35F8-4A88-9D78-BB93E28A5551}"/>
+              </a:ext>
+            </a:extLst>
+          </p:cNvPr>
+          <p:cNvSpPr txBox="1"/>
+          <p:nvPr/>
+        </p:nvSpPr>
+        <p:spPr>
+          <a:xfrm>
+            <a:off x="2648149" y="5148569"/>
+            <a:ext cx="466794" cy="369332"/>
+          </a:xfrm>
+          <a:prstGeom prst="rect">
+            <a:avLst/>
+          </a:prstGeom>
+          <a:noFill/>
+        </p:spPr>
+        <p:txBody>
+          <a:bodyPr wrap="none" rtlCol="0">
+            <a:spAutoFit/>
+          </a:bodyPr>
+          <a:lstStyle/>
+          <a:p>
+            <a:r>
+              <a:rPr lang="en-US" dirty="0"/>
+              <a:t>w6</a:t>
+            </a:r>
+          </a:p>
+        </p:txBody>
+      </p:sp>
     </p:spTree>
     <p:extLst>
       <p:ext uri="{BB962C8B-B14F-4D97-AF65-F5344CB8AC3E}">

</xml_diff>